<commit_message>
Final update before 17th of feb
</commit_message>
<xml_diff>
--- a/Презентация.pptx
+++ b/Презентация.pptx
@@ -13,6 +13,7 @@
     <p:sldId id="262" r:id="rId7"/>
     <p:sldId id="263" r:id="rId8"/>
     <p:sldId id="264" r:id="rId9"/>
+    <p:sldId id="265" r:id="rId10"/>
   </p:sldIdLst>
   <p:sldSz cx="12192000" cy="6858000"/>
   <p:notesSz cx="6858000" cy="9144000"/>
@@ -266,7 +267,7 @@
           <a:p>
             <a:fld id="{4564DCD7-30E3-4781-8FCE-603DB932AE09}" type="datetimeFigureOut">
               <a:rPr lang="ru-RU" smtClean="0"/>
-              <a:t>29.12.2022</a:t>
+              <a:t>16.02.2023</a:t>
             </a:fld>
             <a:endParaRPr lang="ru-RU"/>
           </a:p>
@@ -464,7 +465,7 @@
           <a:p>
             <a:fld id="{4564DCD7-30E3-4781-8FCE-603DB932AE09}" type="datetimeFigureOut">
               <a:rPr lang="ru-RU" smtClean="0"/>
-              <a:t>29.12.2022</a:t>
+              <a:t>16.02.2023</a:t>
             </a:fld>
             <a:endParaRPr lang="ru-RU"/>
           </a:p>
@@ -672,7 +673,7 @@
           <a:p>
             <a:fld id="{4564DCD7-30E3-4781-8FCE-603DB932AE09}" type="datetimeFigureOut">
               <a:rPr lang="ru-RU" smtClean="0"/>
-              <a:t>29.12.2022</a:t>
+              <a:t>16.02.2023</a:t>
             </a:fld>
             <a:endParaRPr lang="ru-RU"/>
           </a:p>
@@ -870,7 +871,7 @@
           <a:p>
             <a:fld id="{4564DCD7-30E3-4781-8FCE-603DB932AE09}" type="datetimeFigureOut">
               <a:rPr lang="ru-RU" smtClean="0"/>
-              <a:t>29.12.2022</a:t>
+              <a:t>16.02.2023</a:t>
             </a:fld>
             <a:endParaRPr lang="ru-RU"/>
           </a:p>
@@ -1145,7 +1146,7 @@
           <a:p>
             <a:fld id="{4564DCD7-30E3-4781-8FCE-603DB932AE09}" type="datetimeFigureOut">
               <a:rPr lang="ru-RU" smtClean="0"/>
-              <a:t>29.12.2022</a:t>
+              <a:t>16.02.2023</a:t>
             </a:fld>
             <a:endParaRPr lang="ru-RU"/>
           </a:p>
@@ -1410,7 +1411,7 @@
           <a:p>
             <a:fld id="{4564DCD7-30E3-4781-8FCE-603DB932AE09}" type="datetimeFigureOut">
               <a:rPr lang="ru-RU" smtClean="0"/>
-              <a:t>29.12.2022</a:t>
+              <a:t>16.02.2023</a:t>
             </a:fld>
             <a:endParaRPr lang="ru-RU"/>
           </a:p>
@@ -1822,7 +1823,7 @@
           <a:p>
             <a:fld id="{4564DCD7-30E3-4781-8FCE-603DB932AE09}" type="datetimeFigureOut">
               <a:rPr lang="ru-RU" smtClean="0"/>
-              <a:t>29.12.2022</a:t>
+              <a:t>16.02.2023</a:t>
             </a:fld>
             <a:endParaRPr lang="ru-RU"/>
           </a:p>
@@ -1963,7 +1964,7 @@
           <a:p>
             <a:fld id="{4564DCD7-30E3-4781-8FCE-603DB932AE09}" type="datetimeFigureOut">
               <a:rPr lang="ru-RU" smtClean="0"/>
-              <a:t>29.12.2022</a:t>
+              <a:t>16.02.2023</a:t>
             </a:fld>
             <a:endParaRPr lang="ru-RU"/>
           </a:p>
@@ -2076,7 +2077,7 @@
           <a:p>
             <a:fld id="{4564DCD7-30E3-4781-8FCE-603DB932AE09}" type="datetimeFigureOut">
               <a:rPr lang="ru-RU" smtClean="0"/>
-              <a:t>29.12.2022</a:t>
+              <a:t>16.02.2023</a:t>
             </a:fld>
             <a:endParaRPr lang="ru-RU"/>
           </a:p>
@@ -2387,7 +2388,7 @@
           <a:p>
             <a:fld id="{4564DCD7-30E3-4781-8FCE-603DB932AE09}" type="datetimeFigureOut">
               <a:rPr lang="ru-RU" smtClean="0"/>
-              <a:t>29.12.2022</a:t>
+              <a:t>16.02.2023</a:t>
             </a:fld>
             <a:endParaRPr lang="ru-RU"/>
           </a:p>
@@ -2675,7 +2676,7 @@
           <a:p>
             <a:fld id="{4564DCD7-30E3-4781-8FCE-603DB932AE09}" type="datetimeFigureOut">
               <a:rPr lang="ru-RU" smtClean="0"/>
-              <a:t>29.12.2022</a:t>
+              <a:t>16.02.2023</a:t>
             </a:fld>
             <a:endParaRPr lang="ru-RU"/>
           </a:p>
@@ -2916,7 +2917,7 @@
           <a:p>
             <a:fld id="{4564DCD7-30E3-4781-8FCE-603DB932AE09}" type="datetimeFigureOut">
               <a:rPr lang="ru-RU" smtClean="0"/>
-              <a:t>29.12.2022</a:t>
+              <a:t>16.02.2023</a:t>
             </a:fld>
             <a:endParaRPr lang="ru-RU"/>
           </a:p>
@@ -4459,7 +4460,15 @@
           <a:p>
             <a:r>
               <a:rPr lang="ru-RU" sz="1800" dirty="0"/>
-              <a:t>Актуальность: настроить систему под себя хочется всем, но есть свои проблемы.</a:t>
+              <a:t>Актуальность: обычная панель управления в </a:t>
+            </a:r>
+            <a:r>
+              <a:rPr lang="en-US" sz="1800" dirty="0"/>
+              <a:t>Windows </a:t>
+            </a:r>
+            <a:r>
+              <a:rPr lang="ru-RU" sz="1800" dirty="0"/>
+              <a:t>не всегда удобна, довольна громоздка </a:t>
             </a:r>
           </a:p>
           <a:p>
@@ -5491,7 +5500,7 @@
             </a:r>
             <a:r>
               <a:rPr lang="ru-RU" sz="2000" dirty="0"/>
-              <a:t>.</a:t>
+              <a:t>, и добавить по возможности свои функции, отсутствующие в панели управления.</a:t>
             </a:r>
           </a:p>
         </p:txBody>
@@ -7104,30 +7113,15 @@
             </a:r>
           </a:p>
           <a:p>
-            <a:pPr marL="457200" indent="-457200">
-              <a:buFont typeface="+mj-lt"/>
-              <a:buAutoNum type="arabicPeriod"/>
-            </a:pPr>
-            <a:r>
-              <a:rPr lang="ru-RU" sz="1800" dirty="0"/>
-              <a:t>Изучена структура </a:t>
-            </a:r>
-            <a:r>
-              <a:rPr lang="en-US" sz="1800" dirty="0"/>
-              <a:t>Windows API.</a:t>
-            </a:r>
-          </a:p>
-          <a:p>
-            <a:pPr marL="457200" indent="-457200">
+            <a:pPr marL="0" indent="0">
               <a:lnSpc>
                 <a:spcPct val="100000"/>
               </a:lnSpc>
-              <a:buFont typeface="+mj-lt"/>
-              <a:buAutoNum type="arabicPeriod"/>
+              <a:buNone/>
             </a:pPr>
             <a:r>
               <a:rPr lang="ru-RU" sz="1800" dirty="0"/>
-              <a:t>Созданы основы для приложения.</a:t>
+              <a:t>2. Созданы основы для приложения: работа с мышью и система «наборов»</a:t>
             </a:r>
           </a:p>
         </p:txBody>
@@ -7587,7 +7581,7 @@
           <p:cNvPr id="2" name="Заголовок 1">
             <a:extLst>
               <a:ext uri="{FF2B5EF4-FFF2-40B4-BE49-F238E27FC236}">
-                <a16:creationId xmlns:a16="http://schemas.microsoft.com/office/drawing/2014/main" id="{FE2F1AEF-A5FB-C26E-9FF5-35FFA83CF564}"/>
+                <a16:creationId xmlns:a16="http://schemas.microsoft.com/office/drawing/2014/main" id="{99422E72-5B51-2831-66F5-21BE5307CACA}"/>
               </a:ext>
             </a:extLst>
           </p:cNvPr>
@@ -7617,7 +7611,7 @@
                   <a:srgbClr val="FFFFFF"/>
                 </a:solidFill>
               </a:rPr>
-              <a:t>Что остаётся сделать.</a:t>
+              <a:t>Ход работы.</a:t>
             </a:r>
           </a:p>
         </p:txBody>
@@ -7627,7 +7621,7 @@
           <p:cNvPr id="3" name="Объект 2">
             <a:extLst>
               <a:ext uri="{FF2B5EF4-FFF2-40B4-BE49-F238E27FC236}">
-                <a16:creationId xmlns:a16="http://schemas.microsoft.com/office/drawing/2014/main" id="{DA9BCBDE-0473-07C2-9EE9-DC1DED503E42}"/>
+                <a16:creationId xmlns:a16="http://schemas.microsoft.com/office/drawing/2014/main" id="{1A12249A-87BC-9A65-2BE1-6C3827E8CA59}"/>
               </a:ext>
             </a:extLst>
           </p:cNvPr>
@@ -7640,8 +7634,8 @@
         </p:nvSpPr>
         <p:spPr>
           <a:xfrm>
-            <a:off x="3837261" y="3162299"/>
-            <a:ext cx="4517473" cy="2117452"/>
+            <a:off x="3540154" y="1622745"/>
+            <a:ext cx="3996654" cy="1523961"/>
           </a:xfrm>
         </p:spPr>
         <p:txBody>
@@ -7650,53 +7644,569 @@
           </a:bodyPr>
           <a:lstStyle/>
           <a:p>
-            <a:pPr marL="342900" indent="-342900">
-              <a:lnSpc>
-                <a:spcPct val="150000"/>
-              </a:lnSpc>
-              <a:buFont typeface="+mj-lt"/>
-              <a:buAutoNum type="arabicPeriod"/>
-            </a:pPr>
+            <a:r>
+              <a:rPr lang="ru-RU" sz="2000" dirty="0"/>
+              <a:t>3. </a:t>
+            </a:r>
             <a:r>
               <a:rPr lang="ru-RU" sz="1800" dirty="0"/>
-              <a:t>Изучить принцип работы с ОС через ЯП.</a:t>
-            </a:r>
-          </a:p>
-          <a:p>
-            <a:pPr marL="342900" indent="-342900">
-              <a:lnSpc>
-                <a:spcPct val="150000"/>
-              </a:lnSpc>
-              <a:buFont typeface="+mj-lt"/>
-              <a:buAutoNum type="arabicPeriod"/>
-            </a:pPr>
-            <a:r>
-              <a:rPr lang="ru-RU" sz="1800" dirty="0"/>
-              <a:t>Добавить функционал настройки ОС.</a:t>
-            </a:r>
-          </a:p>
-          <a:p>
-            <a:pPr marL="342900" indent="-342900">
-              <a:lnSpc>
-                <a:spcPct val="150000"/>
-              </a:lnSpc>
-              <a:buFont typeface="+mj-lt"/>
-              <a:buAutoNum type="arabicPeriod"/>
-            </a:pPr>
-            <a:r>
-              <a:rPr lang="ru-RU" sz="1800" dirty="0"/>
-              <a:t>Продумать и доделать интерфейс.</a:t>
-            </a:r>
-          </a:p>
-          <a:p>
-            <a:endParaRPr lang="ru-RU" sz="2000" dirty="0"/>
-          </a:p>
-        </p:txBody>
-      </p:sp>
+              <a:t>Создана новая идея: т.н. наборы</a:t>
+            </a:r>
+          </a:p>
+        </p:txBody>
+      </p:sp>
+      <p:pic>
+        <p:nvPicPr>
+          <p:cNvPr id="5" name="Рисунок 4" descr="Изображение выглядит как стол&#10;&#10;Автоматически созданное описание">
+            <a:extLst>
+              <a:ext uri="{FF2B5EF4-FFF2-40B4-BE49-F238E27FC236}">
+                <a16:creationId xmlns:a16="http://schemas.microsoft.com/office/drawing/2014/main" id="{E72A4439-8CFD-4539-382C-BE5C79B4333D}"/>
+              </a:ext>
+            </a:extLst>
+          </p:cNvPr>
+          <p:cNvPicPr>
+            <a:picLocks noChangeAspect="1"/>
+          </p:cNvPicPr>
+          <p:nvPr/>
+        </p:nvPicPr>
+        <p:blipFill>
+          <a:blip r:embed="rId2">
+            <a:extLst>
+              <a:ext uri="{28A0092B-C50C-407E-A947-70E740481C1C}">
+                <a14:useLocalDpi xmlns:a14="http://schemas.microsoft.com/office/drawing/2010/main" val="0"/>
+              </a:ext>
+            </a:extLst>
+          </a:blip>
+          <a:stretch>
+            <a:fillRect/>
+          </a:stretch>
+        </p:blipFill>
+        <p:spPr>
+          <a:xfrm>
+            <a:off x="3833769" y="2994869"/>
+            <a:ext cx="3129460" cy="2811163"/>
+          </a:xfrm>
+          <a:prstGeom prst="rect">
+            <a:avLst/>
+          </a:prstGeom>
+        </p:spPr>
+      </p:pic>
     </p:spTree>
     <p:extLst>
       <p:ext uri="{BB962C8B-B14F-4D97-AF65-F5344CB8AC3E}">
-        <p14:creationId xmlns:p14="http://schemas.microsoft.com/office/powerpoint/2010/main" val="3839314436"/>
+        <p14:creationId xmlns:p14="http://schemas.microsoft.com/office/powerpoint/2010/main" val="2006785401"/>
+      </p:ext>
+    </p:extLst>
+  </p:cSld>
+  <p:clrMapOvr>
+    <a:masterClrMapping/>
+  </p:clrMapOvr>
+</p:sld>
+</file>
+
+<file path=ppt/slides/slide9.xml><?xml version="1.0" encoding="utf-8"?>
+<p:sld xmlns:a="http://schemas.openxmlformats.org/drawingml/2006/main" xmlns:r="http://schemas.openxmlformats.org/officeDocument/2006/relationships" xmlns:p="http://schemas.openxmlformats.org/presentationml/2006/main">
+  <p:cSld>
+    <p:bg>
+      <p:bgPr>
+        <a:solidFill>
+          <a:schemeClr val="bg1"/>
+        </a:solidFill>
+        <a:effectLst/>
+      </p:bgPr>
+    </p:bg>
+    <p:spTree>
+      <p:nvGrpSpPr>
+        <p:cNvPr id="1" name=""/>
+        <p:cNvGrpSpPr/>
+        <p:nvPr/>
+      </p:nvGrpSpPr>
+      <p:grpSpPr>
+        <a:xfrm>
+          <a:off x="0" y="0"/>
+          <a:ext cx="0" cy="0"/>
+          <a:chOff x="0" y="0"/>
+          <a:chExt cx="0" cy="0"/>
+        </a:xfrm>
+      </p:grpSpPr>
+      <p:sp useBgFill="1">
+        <p:nvSpPr>
+          <p:cNvPr id="8" name="Rectangle 7">
+            <a:extLst>
+              <a:ext uri="{FF2B5EF4-FFF2-40B4-BE49-F238E27FC236}">
+                <a16:creationId xmlns:a16="http://schemas.microsoft.com/office/drawing/2014/main" id="{1B15ED52-F352-441B-82BF-E0EA34836D08}"/>
+              </a:ext>
+              <a:ext uri="{C183D7F6-B498-43B3-948B-1728B52AA6E4}">
+                <adec:decorative xmlns:adec="http://schemas.microsoft.com/office/drawing/2017/decorative" val="1"/>
+              </a:ext>
+            </a:extLst>
+          </p:cNvPr>
+          <p:cNvSpPr>
+            <a:spLocks noGrp="1" noRot="1" noChangeAspect="1" noMove="1" noResize="1" noEditPoints="1" noAdjustHandles="1" noChangeArrowheads="1" noChangeShapeType="1" noTextEdit="1"/>
+          </p:cNvSpPr>
+          <p:nvPr>
+            <p:extLst>
+              <p:ext uri="{386F3935-93C4-4BCD-93E2-E3B085C9AB24}">
+                <p16:designElem xmlns:p16="http://schemas.microsoft.com/office/powerpoint/2015/main" val="1"/>
+              </p:ext>
+            </p:extLst>
+          </p:nvPr>
+        </p:nvSpPr>
+        <p:spPr>
+          <a:xfrm>
+            <a:off x="0" y="0"/>
+            <a:ext cx="12192000" cy="6858000"/>
+          </a:xfrm>
+          <a:prstGeom prst="rect">
+            <a:avLst/>
+          </a:prstGeom>
+          <a:ln w="12700" cap="flat" cmpd="sng" algn="ctr">
+            <a:noFill/>
+            <a:prstDash val="solid"/>
+            <a:miter lim="800000"/>
+          </a:ln>
+          <a:effectLst/>
+          <a:extLst>
+            <a:ext uri="{91240B29-F687-4F45-9708-019B960494DF}">
+              <a14:hiddenLine xmlns:a14="http://schemas.microsoft.com/office/drawing/2010/main" w="12700" cap="flat" cmpd="sng" algn="ctr">
+                <a:solidFill>
+                  <a:schemeClr val="accent1">
+                    <a:shade val="50000"/>
+                  </a:schemeClr>
+                </a:solidFill>
+                <a:prstDash val="solid"/>
+                <a:miter lim="800000"/>
+              </a14:hiddenLine>
+            </a:ext>
+          </a:extLst>
+        </p:spPr>
+        <p:style>
+          <a:lnRef idx="2">
+            <a:schemeClr val="accent1">
+              <a:shade val="50000"/>
+            </a:schemeClr>
+          </a:lnRef>
+          <a:fillRef idx="1">
+            <a:schemeClr val="accent1"/>
+          </a:fillRef>
+          <a:effectRef idx="0">
+            <a:schemeClr val="accent1"/>
+          </a:effectRef>
+          <a:fontRef idx="minor">
+            <a:schemeClr val="lt1"/>
+          </a:fontRef>
+        </p:style>
+        <p:txBody>
+          <a:bodyPr rtlCol="0" anchor="ctr"/>
+          <a:lstStyle/>
+          <a:p>
+            <a:pPr algn="ctr"/>
+            <a:endParaRPr lang="en-US"/>
+          </a:p>
+        </p:txBody>
+      </p:sp>
+      <p:sp>
+        <p:nvSpPr>
+          <p:cNvPr id="10" name="Rectangle 9">
+            <a:extLst>
+              <a:ext uri="{FF2B5EF4-FFF2-40B4-BE49-F238E27FC236}">
+                <a16:creationId xmlns:a16="http://schemas.microsoft.com/office/drawing/2014/main" id="{3B2E3793-BFE6-45A2-9B7B-E18844431C99}"/>
+              </a:ext>
+              <a:ext uri="{C183D7F6-B498-43B3-948B-1728B52AA6E4}">
+                <adec:decorative xmlns:adec="http://schemas.microsoft.com/office/drawing/2017/decorative" val="1"/>
+              </a:ext>
+            </a:extLst>
+          </p:cNvPr>
+          <p:cNvSpPr>
+            <a:spLocks noGrp="1" noRot="1" noChangeAspect="1" noMove="1" noResize="1" noEditPoints="1" noAdjustHandles="1" noChangeArrowheads="1" noChangeShapeType="1" noTextEdit="1"/>
+          </p:cNvSpPr>
+          <p:nvPr>
+            <p:extLst>
+              <p:ext uri="{386F3935-93C4-4BCD-93E2-E3B085C9AB24}">
+                <p16:designElem xmlns:p16="http://schemas.microsoft.com/office/powerpoint/2015/main" val="1"/>
+              </p:ext>
+            </p:extLst>
+          </p:nvPr>
+        </p:nvSpPr>
+        <p:spPr>
+          <a:xfrm flipH="1">
+            <a:off x="-1" y="-1"/>
+            <a:ext cx="12191998" cy="1590742"/>
+          </a:xfrm>
+          <a:prstGeom prst="rect">
+            <a:avLst/>
+          </a:prstGeom>
+          <a:gradFill>
+            <a:gsLst>
+              <a:gs pos="0">
+                <a:srgbClr val="000000"/>
+              </a:gs>
+              <a:gs pos="100000">
+                <a:schemeClr val="accent1">
+                  <a:lumMod val="75000"/>
+                </a:schemeClr>
+              </a:gs>
+            </a:gsLst>
+            <a:lin ang="8400000" scaled="0"/>
+          </a:gradFill>
+          <a:ln>
+            <a:noFill/>
+          </a:ln>
+        </p:spPr>
+        <p:style>
+          <a:lnRef idx="2">
+            <a:schemeClr val="accent1">
+              <a:shade val="50000"/>
+            </a:schemeClr>
+          </a:lnRef>
+          <a:fillRef idx="1">
+            <a:schemeClr val="accent1"/>
+          </a:fillRef>
+          <a:effectRef idx="0">
+            <a:schemeClr val="accent1"/>
+          </a:effectRef>
+          <a:fontRef idx="minor">
+            <a:schemeClr val="lt1"/>
+          </a:fontRef>
+        </p:style>
+        <p:txBody>
+          <a:bodyPr rtlCol="0" anchor="ctr"/>
+          <a:lstStyle/>
+          <a:p>
+            <a:pPr algn="ctr"/>
+            <a:endParaRPr lang="en-US"/>
+          </a:p>
+        </p:txBody>
+      </p:sp>
+      <p:sp>
+        <p:nvSpPr>
+          <p:cNvPr id="12" name="Rectangle 11">
+            <a:extLst>
+              <a:ext uri="{FF2B5EF4-FFF2-40B4-BE49-F238E27FC236}">
+                <a16:creationId xmlns:a16="http://schemas.microsoft.com/office/drawing/2014/main" id="{BC4C4868-CB8F-4AF9-9CDB-8108F2C19B67}"/>
+              </a:ext>
+              <a:ext uri="{C183D7F6-B498-43B3-948B-1728B52AA6E4}">
+                <adec:decorative xmlns:adec="http://schemas.microsoft.com/office/drawing/2017/decorative" val="1"/>
+              </a:ext>
+            </a:extLst>
+          </p:cNvPr>
+          <p:cNvSpPr>
+            <a:spLocks noGrp="1" noRot="1" noChangeAspect="1" noMove="1" noResize="1" noEditPoints="1" noAdjustHandles="1" noChangeArrowheads="1" noChangeShapeType="1" noTextEdit="1"/>
+          </p:cNvSpPr>
+          <p:nvPr>
+            <p:extLst>
+              <p:ext uri="{386F3935-93C4-4BCD-93E2-E3B085C9AB24}">
+                <p16:designElem xmlns:p16="http://schemas.microsoft.com/office/powerpoint/2015/main" val="1"/>
+              </p:ext>
+            </p:extLst>
+          </p:nvPr>
+        </p:nvSpPr>
+        <p:spPr>
+          <a:xfrm rot="10800000" flipH="1">
+            <a:off x="-3" y="0"/>
+            <a:ext cx="8115306" cy="1590742"/>
+          </a:xfrm>
+          <a:prstGeom prst="rect">
+            <a:avLst/>
+          </a:prstGeom>
+          <a:gradFill>
+            <a:gsLst>
+              <a:gs pos="20000">
+                <a:schemeClr val="accent1">
+                  <a:alpha val="0"/>
+                </a:schemeClr>
+              </a:gs>
+              <a:gs pos="100000">
+                <a:schemeClr val="accent1">
+                  <a:lumMod val="50000"/>
+                  <a:alpha val="55000"/>
+                </a:schemeClr>
+              </a:gs>
+            </a:gsLst>
+            <a:lin ang="13800000" scaled="0"/>
+          </a:gradFill>
+          <a:ln>
+            <a:noFill/>
+          </a:ln>
+        </p:spPr>
+        <p:style>
+          <a:lnRef idx="2">
+            <a:schemeClr val="accent1">
+              <a:shade val="50000"/>
+            </a:schemeClr>
+          </a:lnRef>
+          <a:fillRef idx="1">
+            <a:schemeClr val="accent1"/>
+          </a:fillRef>
+          <a:effectRef idx="0">
+            <a:schemeClr val="accent1"/>
+          </a:effectRef>
+          <a:fontRef idx="minor">
+            <a:schemeClr val="lt1"/>
+          </a:fontRef>
+        </p:style>
+        <p:txBody>
+          <a:bodyPr rtlCol="0" anchor="ctr"/>
+          <a:lstStyle/>
+          <a:p>
+            <a:pPr algn="ctr"/>
+            <a:endParaRPr lang="en-US"/>
+          </a:p>
+        </p:txBody>
+      </p:sp>
+      <p:sp>
+        <p:nvSpPr>
+          <p:cNvPr id="14" name="Rectangle 13">
+            <a:extLst>
+              <a:ext uri="{FF2B5EF4-FFF2-40B4-BE49-F238E27FC236}">
+                <a16:creationId xmlns:a16="http://schemas.microsoft.com/office/drawing/2014/main" id="{375E0459-6403-40CD-989D-56A4407CA12E}"/>
+              </a:ext>
+              <a:ext uri="{C183D7F6-B498-43B3-948B-1728B52AA6E4}">
+                <adec:decorative xmlns:adec="http://schemas.microsoft.com/office/drawing/2017/decorative" val="1"/>
+              </a:ext>
+            </a:extLst>
+          </p:cNvPr>
+          <p:cNvSpPr>
+            <a:spLocks noGrp="1" noRot="1" noChangeAspect="1" noMove="1" noResize="1" noEditPoints="1" noAdjustHandles="1" noChangeArrowheads="1" noChangeShapeType="1" noTextEdit="1"/>
+          </p:cNvSpPr>
+          <p:nvPr>
+            <p:extLst>
+              <p:ext uri="{386F3935-93C4-4BCD-93E2-E3B085C9AB24}">
+                <p16:designElem xmlns:p16="http://schemas.microsoft.com/office/powerpoint/2015/main" val="1"/>
+              </p:ext>
+            </p:extLst>
+          </p:nvPr>
+        </p:nvSpPr>
+        <p:spPr>
+          <a:xfrm flipH="1">
+            <a:off x="8115299" y="-1"/>
+            <a:ext cx="4076698" cy="1590742"/>
+          </a:xfrm>
+          <a:prstGeom prst="rect">
+            <a:avLst/>
+          </a:prstGeom>
+          <a:gradFill>
+            <a:gsLst>
+              <a:gs pos="0">
+                <a:schemeClr val="accent1">
+                  <a:alpha val="66000"/>
+                </a:schemeClr>
+              </a:gs>
+              <a:gs pos="100000">
+                <a:srgbClr val="000000">
+                  <a:alpha val="30000"/>
+                </a:srgbClr>
+              </a:gs>
+            </a:gsLst>
+            <a:lin ang="13200000" scaled="0"/>
+          </a:gradFill>
+          <a:ln>
+            <a:noFill/>
+          </a:ln>
+        </p:spPr>
+        <p:style>
+          <a:lnRef idx="2">
+            <a:schemeClr val="accent1">
+              <a:shade val="50000"/>
+            </a:schemeClr>
+          </a:lnRef>
+          <a:fillRef idx="1">
+            <a:schemeClr val="accent1"/>
+          </a:fillRef>
+          <a:effectRef idx="0">
+            <a:schemeClr val="accent1"/>
+          </a:effectRef>
+          <a:fontRef idx="minor">
+            <a:schemeClr val="lt1"/>
+          </a:fontRef>
+        </p:style>
+        <p:txBody>
+          <a:bodyPr rtlCol="0" anchor="ctr"/>
+          <a:lstStyle/>
+          <a:p>
+            <a:pPr algn="ctr"/>
+            <a:endParaRPr lang="en-US"/>
+          </a:p>
+        </p:txBody>
+      </p:sp>
+      <p:sp>
+        <p:nvSpPr>
+          <p:cNvPr id="16" name="Rectangle 15">
+            <a:extLst>
+              <a:ext uri="{FF2B5EF4-FFF2-40B4-BE49-F238E27FC236}">
+                <a16:creationId xmlns:a16="http://schemas.microsoft.com/office/drawing/2014/main" id="{53E5B1A8-3AC9-4BD1-9BBC-78CA94F2D1BA}"/>
+              </a:ext>
+              <a:ext uri="{C183D7F6-B498-43B3-948B-1728B52AA6E4}">
+                <adec:decorative xmlns:adec="http://schemas.microsoft.com/office/drawing/2017/decorative" val="1"/>
+              </a:ext>
+            </a:extLst>
+          </p:cNvPr>
+          <p:cNvSpPr>
+            <a:spLocks noGrp="1" noRot="1" noChangeAspect="1" noMove="1" noResize="1" noEditPoints="1" noAdjustHandles="1" noChangeArrowheads="1" noChangeShapeType="1" noTextEdit="1"/>
+          </p:cNvSpPr>
+          <p:nvPr>
+            <p:extLst>
+              <p:ext uri="{386F3935-93C4-4BCD-93E2-E3B085C9AB24}">
+                <p16:designElem xmlns:p16="http://schemas.microsoft.com/office/powerpoint/2015/main" val="1"/>
+              </p:ext>
+            </p:extLst>
+          </p:nvPr>
+        </p:nvSpPr>
+        <p:spPr>
+          <a:xfrm>
+            <a:off x="459350" y="-1"/>
+            <a:ext cx="11732646" cy="1597433"/>
+          </a:xfrm>
+          <a:prstGeom prst="rect">
+            <a:avLst/>
+          </a:prstGeom>
+          <a:gradFill>
+            <a:gsLst>
+              <a:gs pos="50000">
+                <a:srgbClr val="000000">
+                  <a:alpha val="0"/>
+                </a:srgbClr>
+              </a:gs>
+              <a:gs pos="99000">
+                <a:schemeClr val="accent1">
+                  <a:lumMod val="50000"/>
+                  <a:alpha val="52000"/>
+                </a:schemeClr>
+              </a:gs>
+            </a:gsLst>
+            <a:lin ang="16800000" scaled="0"/>
+          </a:gradFill>
+          <a:ln>
+            <a:noFill/>
+          </a:ln>
+        </p:spPr>
+        <p:style>
+          <a:lnRef idx="2">
+            <a:schemeClr val="accent1">
+              <a:shade val="50000"/>
+            </a:schemeClr>
+          </a:lnRef>
+          <a:fillRef idx="1">
+            <a:schemeClr val="accent1"/>
+          </a:fillRef>
+          <a:effectRef idx="0">
+            <a:schemeClr val="accent1"/>
+          </a:effectRef>
+          <a:fontRef idx="minor">
+            <a:schemeClr val="lt1"/>
+          </a:fontRef>
+        </p:style>
+        <p:txBody>
+          <a:bodyPr rtlCol="0" anchor="ctr"/>
+          <a:lstStyle/>
+          <a:p>
+            <a:pPr algn="ctr"/>
+            <a:endParaRPr lang="en-US"/>
+          </a:p>
+        </p:txBody>
+      </p:sp>
+      <p:sp>
+        <p:nvSpPr>
+          <p:cNvPr id="2" name="Заголовок 1">
+            <a:extLst>
+              <a:ext uri="{FF2B5EF4-FFF2-40B4-BE49-F238E27FC236}">
+                <a16:creationId xmlns:a16="http://schemas.microsoft.com/office/drawing/2014/main" id="{12C375E8-501A-9A2E-7FE3-3913E0E16795}"/>
+              </a:ext>
+            </a:extLst>
+          </p:cNvPr>
+          <p:cNvSpPr>
+            <a:spLocks noGrp="1"/>
+          </p:cNvSpPr>
+          <p:nvPr>
+            <p:ph type="title"/>
+          </p:nvPr>
+        </p:nvSpPr>
+        <p:spPr>
+          <a:xfrm>
+            <a:off x="1371599" y="294538"/>
+            <a:ext cx="9895951" cy="1033669"/>
+          </a:xfrm>
+        </p:spPr>
+        <p:txBody>
+          <a:bodyPr>
+            <a:normAutofit/>
+          </a:bodyPr>
+          <a:lstStyle/>
+          <a:p>
+            <a:pPr algn="ctr"/>
+            <a:r>
+              <a:rPr lang="ru-RU" sz="2400" dirty="0">
+                <a:solidFill>
+                  <a:srgbClr val="FFFFFF"/>
+                </a:solidFill>
+              </a:rPr>
+              <a:t>При создании были использованы</a:t>
+            </a:r>
+          </a:p>
+        </p:txBody>
+      </p:sp>
+      <p:sp>
+        <p:nvSpPr>
+          <p:cNvPr id="3" name="Объект 2">
+            <a:extLst>
+              <a:ext uri="{FF2B5EF4-FFF2-40B4-BE49-F238E27FC236}">
+                <a16:creationId xmlns:a16="http://schemas.microsoft.com/office/drawing/2014/main" id="{D201EC84-0D03-3D5F-EFA5-CCBA0E93E174}"/>
+              </a:ext>
+            </a:extLst>
+          </p:cNvPr>
+          <p:cNvSpPr>
+            <a:spLocks noGrp="1"/>
+          </p:cNvSpPr>
+          <p:nvPr>
+            <p:ph idx="1"/>
+          </p:nvPr>
+        </p:nvSpPr>
+        <p:spPr>
+          <a:xfrm>
+            <a:off x="3025627" y="3036814"/>
+            <a:ext cx="6140741" cy="1849005"/>
+          </a:xfrm>
+        </p:spPr>
+        <p:txBody>
+          <a:bodyPr anchor="ctr">
+            <a:normAutofit/>
+          </a:bodyPr>
+          <a:lstStyle/>
+          <a:p>
+            <a:r>
+              <a:rPr lang="ru-RU" sz="1800" dirty="0"/>
+              <a:t>Официальная документация </a:t>
+            </a:r>
+            <a:r>
+              <a:rPr lang="en-US" sz="1800" dirty="0"/>
+              <a:t>Microsoft</a:t>
+            </a:r>
+          </a:p>
+          <a:p>
+            <a:r>
+              <a:rPr lang="ru-RU" sz="1800" dirty="0"/>
+              <a:t>Библиотека для работы с </a:t>
+            </a:r>
+            <a:r>
+              <a:rPr lang="en-US" sz="1800" dirty="0" err="1"/>
+              <a:t>json</a:t>
+            </a:r>
+            <a:r>
+              <a:rPr lang="en-US" sz="1800" dirty="0"/>
+              <a:t> </a:t>
+            </a:r>
+            <a:r>
+              <a:rPr lang="en-US" sz="1800" dirty="0" err="1"/>
+              <a:t>nlohmann-json</a:t>
+            </a:r>
+            <a:endParaRPr lang="ru-RU" sz="1800" dirty="0"/>
+          </a:p>
+        </p:txBody>
+      </p:sp>
+    </p:spTree>
+    <p:extLst>
+      <p:ext uri="{BB962C8B-B14F-4D97-AF65-F5344CB8AC3E}">
+        <p14:creationId xmlns:p14="http://schemas.microsoft.com/office/powerpoint/2010/main" val="156814629"/>
       </p:ext>
     </p:extLst>
   </p:cSld>

</xml_diff>